<commit_message>
Includes Additional Video Link
</commit_message>
<xml_diff>
--- a/Scribblers On The Roof.pptx
+++ b/Scribblers On The Roof.pptx
@@ -8208,7 +8208,10 @@
             <a:pPr marL="114300" indent="0" algn="ctr">
               <a:buNone/>
             </a:pPr>
-            <a:endParaRPr lang="en-US" dirty="0"/>
+            <a:r>
+              <a:rPr lang="en-US" dirty="0"/>
+              <a:t>Single Scribble Demonstration</a:t>
+            </a:r>
           </a:p>
           <a:p>
             <a:pPr marL="114300" indent="0" algn="ctr">
@@ -8219,6 +8222,28 @@
                 <a:hlinkClick r:id="rId2"/>
               </a:rPr>
               <a:t>https://youtu.be/pFRYrKUPPnQ</a:t>
+            </a:r>
+            <a:endParaRPr lang="en-US" sz="4000" dirty="0"/>
+          </a:p>
+          <a:p>
+            <a:pPr marL="114300" indent="0" algn="ctr">
+              <a:buNone/>
+            </a:pPr>
+            <a:r>
+              <a:rPr lang="en-US" dirty="0"/>
+              <a:t>Multiple Scribbles Demonstration</a:t>
+            </a:r>
+            <a:endParaRPr lang="en-US" sz="4000" dirty="0"/>
+          </a:p>
+          <a:p>
+            <a:pPr marL="114300" indent="0" algn="ctr">
+              <a:buNone/>
+            </a:pPr>
+            <a:r>
+              <a:rPr lang="en-US" sz="4000" dirty="0">
+                <a:hlinkClick r:id="rId3"/>
+              </a:rPr>
+              <a:t>https://youtu.be/03-BzOdNZQU</a:t>
             </a:r>
             <a:endParaRPr lang="en-US" sz="4000" dirty="0"/>
           </a:p>

</xml_diff>